<commit_message>
errori su errori miei...
</commit_message>
<xml_diff>
--- a/RQ/Esterni/presentazione/RP-Presentazione_w_mobile.pptx
+++ b/RQ/Esterni/presentazione/RP-Presentazione_w_mobile.pptx
@@ -184,7 +184,7 @@
           <a:bodyPr anchor="b" bIns="0" lIns="0" rIns="0" tIns="0" wrap="none"/>
           <a:p>
             <a:pPr algn="r"/>
-            <a:fld id="{21D13171-0141-4181-8141-E13151313101}" type="slidenum">
+            <a:fld id="{8131E171-A131-4131-8151-A101D1E1A1F1}" type="slidenum">
               <a:rPr lang="it-IT"/>
               <a:t>&lt;number&gt;</a:t>
             </a:fld>
@@ -228,7 +228,7 @@
         <p:spPr>
           <a:xfrm>
             <a:off x="0" y="0"/>
-            <a:ext cx="11796480" cy="11796480"/>
+            <a:ext cx="11796120" cy="11796120"/>
           </a:xfrm>
           <a:prstGeom prst="rect">
             <a:avLst/>
@@ -250,7 +250,7 @@
         <p:spPr>
           <a:xfrm>
             <a:off x="0" y="0"/>
-            <a:ext cx="11796480" cy="11796480"/>
+            <a:ext cx="11796120" cy="11796120"/>
           </a:xfrm>
           <a:prstGeom prst="rect">
             <a:avLst/>
@@ -264,7 +264,7 @@
                 <a:spcPct val="100000"/>
               </a:lnSpc>
             </a:pPr>
-            <a:fld id="{2141E111-6181-4121-B101-2171A1617191}" type="slidenum">
+            <a:fld id="{81317111-D1F1-41A1-8181-8191210121F1}" type="slidenum">
               <a:rPr lang="it-IT">
                 <a:solidFill>
                   <a:srgbClr val="000000"/>
@@ -335,7 +335,7 @@
         <p:spPr>
           <a:xfrm>
             <a:off x="1043640" y="1027800"/>
-            <a:ext cx="7023960" cy="1143000"/>
+            <a:ext cx="7023600" cy="1143000"/>
           </a:xfrm>
           <a:prstGeom prst="rect">
             <a:avLst/>
@@ -436,7 +436,7 @@
         <p:spPr>
           <a:xfrm>
             <a:off x="1043640" y="1027800"/>
-            <a:ext cx="7023960" cy="1143000"/>
+            <a:ext cx="7023600" cy="1143000"/>
           </a:xfrm>
           <a:prstGeom prst="rect">
             <a:avLst/>
@@ -589,7 +589,7 @@
         <p:spPr>
           <a:xfrm>
             <a:off x="1043640" y="1027800"/>
-            <a:ext cx="7023960" cy="1143000"/>
+            <a:ext cx="7023600" cy="1143000"/>
           </a:xfrm>
           <a:prstGeom prst="rect">
             <a:avLst/>
@@ -712,7 +712,7 @@
         <p:spPr>
           <a:xfrm>
             <a:off x="1043640" y="1027800"/>
-            <a:ext cx="7023960" cy="1143000"/>
+            <a:ext cx="7023600" cy="1143000"/>
           </a:xfrm>
           <a:prstGeom prst="rect">
             <a:avLst/>
@@ -788,7 +788,7 @@
         <p:spPr>
           <a:xfrm>
             <a:off x="1043640" y="1027800"/>
-            <a:ext cx="7023960" cy="1143000"/>
+            <a:ext cx="7023600" cy="1143000"/>
           </a:xfrm>
           <a:prstGeom prst="rect">
             <a:avLst/>
@@ -863,7 +863,7 @@
         <p:spPr>
           <a:xfrm>
             <a:off x="1043640" y="1027800"/>
-            <a:ext cx="7023960" cy="1143000"/>
+            <a:ext cx="7023600" cy="1143000"/>
           </a:xfrm>
           <a:prstGeom prst="rect">
             <a:avLst/>
@@ -964,7 +964,7 @@
         <p:spPr>
           <a:xfrm>
             <a:off x="1043640" y="1027800"/>
-            <a:ext cx="7023960" cy="1143000"/>
+            <a:ext cx="7023600" cy="1143000"/>
           </a:xfrm>
           <a:prstGeom prst="rect">
             <a:avLst/>
@@ -1013,7 +1013,7 @@
         <p:spPr>
           <a:xfrm>
             <a:off x="1043640" y="1027800"/>
-            <a:ext cx="7023960" cy="5102640"/>
+            <a:ext cx="7023600" cy="5102640"/>
           </a:xfrm>
           <a:prstGeom prst="rect">
             <a:avLst/>
@@ -1062,7 +1062,7 @@
         <p:spPr>
           <a:xfrm>
             <a:off x="1043640" y="1027800"/>
-            <a:ext cx="7023960" cy="1143000"/>
+            <a:ext cx="7023600" cy="1143000"/>
           </a:xfrm>
           <a:prstGeom prst="rect">
             <a:avLst/>
@@ -1189,7 +1189,7 @@
         <p:spPr>
           <a:xfrm>
             <a:off x="1043640" y="1027800"/>
-            <a:ext cx="7023960" cy="1143000"/>
+            <a:ext cx="7023600" cy="1143000"/>
           </a:xfrm>
           <a:prstGeom prst="rect">
             <a:avLst/>
@@ -1265,7 +1265,7 @@
         <p:spPr>
           <a:xfrm>
             <a:off x="1043640" y="1027800"/>
-            <a:ext cx="7023960" cy="1143000"/>
+            <a:ext cx="7023600" cy="1143000"/>
           </a:xfrm>
           <a:prstGeom prst="rect">
             <a:avLst/>
@@ -1392,7 +1392,7 @@
         <p:spPr>
           <a:xfrm>
             <a:off x="1043640" y="1027800"/>
-            <a:ext cx="7023960" cy="1143000"/>
+            <a:ext cx="7023600" cy="1143000"/>
           </a:xfrm>
           <a:prstGeom prst="rect">
             <a:avLst/>
@@ -1519,7 +1519,7 @@
         <p:spPr>
           <a:xfrm>
             <a:off x="1043640" y="1027800"/>
-            <a:ext cx="7023960" cy="1143000"/>
+            <a:ext cx="7023600" cy="1143000"/>
           </a:xfrm>
           <a:prstGeom prst="rect">
             <a:avLst/>
@@ -1620,7 +1620,7 @@
         <p:spPr>
           <a:xfrm>
             <a:off x="1043640" y="1027800"/>
-            <a:ext cx="7023960" cy="1143000"/>
+            <a:ext cx="7023600" cy="1143000"/>
           </a:xfrm>
           <a:prstGeom prst="rect">
             <a:avLst/>
@@ -1773,7 +1773,7 @@
         <p:spPr>
           <a:xfrm>
             <a:off x="1043640" y="1027800"/>
-            <a:ext cx="7023960" cy="1143000"/>
+            <a:ext cx="7023600" cy="1143000"/>
           </a:xfrm>
           <a:prstGeom prst="rect">
             <a:avLst/>
@@ -1896,7 +1896,7 @@
         <p:spPr>
           <a:xfrm>
             <a:off x="1043640" y="1027800"/>
-            <a:ext cx="7023960" cy="1143000"/>
+            <a:ext cx="7023600" cy="1143000"/>
           </a:xfrm>
           <a:prstGeom prst="rect">
             <a:avLst/>
@@ -1972,7 +1972,7 @@
         <p:spPr>
           <a:xfrm>
             <a:off x="1043640" y="1027800"/>
-            <a:ext cx="7023960" cy="1143000"/>
+            <a:ext cx="7023600" cy="1143000"/>
           </a:xfrm>
           <a:prstGeom prst="rect">
             <a:avLst/>
@@ -2047,7 +2047,7 @@
         <p:spPr>
           <a:xfrm>
             <a:off x="1043640" y="1027800"/>
-            <a:ext cx="7023960" cy="1143000"/>
+            <a:ext cx="7023600" cy="1143000"/>
           </a:xfrm>
           <a:prstGeom prst="rect">
             <a:avLst/>
@@ -2148,7 +2148,7 @@
         <p:spPr>
           <a:xfrm>
             <a:off x="1043640" y="1027800"/>
-            <a:ext cx="7023960" cy="1143000"/>
+            <a:ext cx="7023600" cy="1143000"/>
           </a:xfrm>
           <a:prstGeom prst="rect">
             <a:avLst/>
@@ -2197,7 +2197,7 @@
         <p:spPr>
           <a:xfrm>
             <a:off x="1043640" y="1027800"/>
-            <a:ext cx="7023960" cy="1143000"/>
+            <a:ext cx="7023600" cy="1143000"/>
           </a:xfrm>
           <a:prstGeom prst="rect">
             <a:avLst/>
@@ -2272,7 +2272,7 @@
         <p:spPr>
           <a:xfrm>
             <a:off x="1043640" y="1027800"/>
-            <a:ext cx="7023960" cy="5102640"/>
+            <a:ext cx="7023600" cy="5102640"/>
           </a:xfrm>
           <a:prstGeom prst="rect">
             <a:avLst/>
@@ -2321,7 +2321,7 @@
         <p:spPr>
           <a:xfrm>
             <a:off x="1043640" y="1027800"/>
-            <a:ext cx="7023960" cy="1143000"/>
+            <a:ext cx="7023600" cy="1143000"/>
           </a:xfrm>
           <a:prstGeom prst="rect">
             <a:avLst/>
@@ -2448,7 +2448,7 @@
         <p:spPr>
           <a:xfrm>
             <a:off x="1043640" y="1027800"/>
-            <a:ext cx="7023960" cy="1143000"/>
+            <a:ext cx="7023600" cy="1143000"/>
           </a:xfrm>
           <a:prstGeom prst="rect">
             <a:avLst/>
@@ -2575,7 +2575,7 @@
         <p:spPr>
           <a:xfrm>
             <a:off x="1043640" y="1027800"/>
-            <a:ext cx="7023960" cy="1143000"/>
+            <a:ext cx="7023600" cy="1143000"/>
           </a:xfrm>
           <a:prstGeom prst="rect">
             <a:avLst/>
@@ -2702,7 +2702,7 @@
         <p:spPr>
           <a:xfrm>
             <a:off x="1043640" y="1027800"/>
-            <a:ext cx="7023960" cy="1143000"/>
+            <a:ext cx="7023600" cy="1143000"/>
           </a:xfrm>
           <a:prstGeom prst="rect">
             <a:avLst/>
@@ -2803,7 +2803,7 @@
         <p:spPr>
           <a:xfrm>
             <a:off x="1043640" y="1027800"/>
-            <a:ext cx="7023960" cy="1143000"/>
+            <a:ext cx="7023600" cy="1143000"/>
           </a:xfrm>
           <a:prstGeom prst="rect">
             <a:avLst/>
@@ -2956,7 +2956,7 @@
         <p:spPr>
           <a:xfrm>
             <a:off x="1043640" y="1027800"/>
-            <a:ext cx="7023960" cy="1143000"/>
+            <a:ext cx="7023600" cy="1143000"/>
           </a:xfrm>
           <a:prstGeom prst="rect">
             <a:avLst/>
@@ -3057,7 +3057,7 @@
         <p:spPr>
           <a:xfrm>
             <a:off x="1043640" y="1027800"/>
-            <a:ext cx="7023960" cy="1143000"/>
+            <a:ext cx="7023600" cy="1143000"/>
           </a:xfrm>
           <a:prstGeom prst="rect">
             <a:avLst/>
@@ -3158,7 +3158,7 @@
         <p:spPr>
           <a:xfrm>
             <a:off x="1043640" y="1027800"/>
-            <a:ext cx="7023960" cy="1143000"/>
+            <a:ext cx="7023600" cy="1143000"/>
           </a:xfrm>
           <a:prstGeom prst="rect">
             <a:avLst/>
@@ -3207,7 +3207,7 @@
         <p:spPr>
           <a:xfrm>
             <a:off x="1043640" y="1027800"/>
-            <a:ext cx="7023960" cy="5102640"/>
+            <a:ext cx="7023600" cy="5102640"/>
           </a:xfrm>
           <a:prstGeom prst="rect">
             <a:avLst/>
@@ -3256,7 +3256,7 @@
         <p:spPr>
           <a:xfrm>
             <a:off x="1043640" y="1027800"/>
-            <a:ext cx="7023960" cy="1143000"/>
+            <a:ext cx="7023600" cy="1143000"/>
           </a:xfrm>
           <a:prstGeom prst="rect">
             <a:avLst/>
@@ -3383,7 +3383,7 @@
         <p:spPr>
           <a:xfrm>
             <a:off x="1043640" y="1027800"/>
-            <a:ext cx="7023960" cy="1143000"/>
+            <a:ext cx="7023600" cy="1143000"/>
           </a:xfrm>
           <a:prstGeom prst="rect">
             <a:avLst/>
@@ -3510,7 +3510,7 @@
         <p:spPr>
           <a:xfrm>
             <a:off x="1043640" y="1027800"/>
-            <a:ext cx="7023960" cy="1143000"/>
+            <a:ext cx="7023600" cy="1143000"/>
           </a:xfrm>
           <a:prstGeom prst="rect">
             <a:avLst/>
@@ -3633,7 +3633,7 @@
         <p:spPr>
           <a:xfrm>
             <a:off x="992160" y="0"/>
-            <a:ext cx="1599480" cy="6857280"/>
+            <a:ext cx="1599120" cy="6856920"/>
           </a:xfrm>
           <a:prstGeom prst="rect">
             <a:avLst/>
@@ -3652,7 +3652,7 @@
         <p:spPr>
           <a:xfrm>
             <a:off x="77760" y="0"/>
-            <a:ext cx="456480" cy="6857280"/>
+            <a:ext cx="456120" cy="6856920"/>
           </a:xfrm>
           <a:prstGeom prst="rect">
             <a:avLst/>
@@ -3671,7 +3671,7 @@
         <p:spPr>
           <a:xfrm>
             <a:off x="306360" y="0"/>
-            <a:ext cx="761400" cy="6857280"/>
+            <a:ext cx="761040" cy="6856920"/>
           </a:xfrm>
           <a:prstGeom prst="rect">
             <a:avLst/>
@@ -3690,7 +3690,7 @@
         <p:spPr>
           <a:xfrm>
             <a:off x="1414800" y="0"/>
-            <a:ext cx="1599480" cy="6857280"/>
+            <a:ext cx="1599120" cy="6856920"/>
           </a:xfrm>
           <a:prstGeom prst="rect">
             <a:avLst/>
@@ -3709,7 +3709,7 @@
         <p:spPr>
           <a:xfrm>
             <a:off x="500400" y="0"/>
-            <a:ext cx="456480" cy="6857280"/>
+            <a:ext cx="456120" cy="6856920"/>
           </a:xfrm>
           <a:prstGeom prst="rect">
             <a:avLst/>
@@ -3728,7 +3728,7 @@
         <p:spPr>
           <a:xfrm>
             <a:off x="729000" y="0"/>
-            <a:ext cx="761400" cy="6857280"/>
+            <a:ext cx="761040" cy="6856920"/>
           </a:xfrm>
           <a:prstGeom prst="rect">
             <a:avLst/>
@@ -3747,7 +3747,7 @@
         <p:spPr>
           <a:xfrm>
             <a:off x="8307360" y="6858000"/>
-            <a:ext cx="1599480" cy="6857280"/>
+            <a:ext cx="1599120" cy="6856920"/>
           </a:xfrm>
           <a:prstGeom prst="rect">
             <a:avLst/>
@@ -3766,7 +3766,7 @@
         <p:spPr>
           <a:xfrm>
             <a:off x="9221760" y="6858000"/>
-            <a:ext cx="456480" cy="6857280"/>
+            <a:ext cx="456120" cy="6856920"/>
           </a:xfrm>
           <a:prstGeom prst="rect">
             <a:avLst/>
@@ -3785,7 +3785,7 @@
         <p:spPr>
           <a:xfrm>
             <a:off x="8993160" y="6858000"/>
-            <a:ext cx="761400" cy="6857280"/>
+            <a:ext cx="761040" cy="6856920"/>
           </a:xfrm>
           <a:prstGeom prst="rect">
             <a:avLst/>
@@ -3804,7 +3804,7 @@
         <p:spPr>
           <a:xfrm>
             <a:off x="3887640" y="0"/>
-            <a:ext cx="2818800" cy="6857280"/>
+            <a:ext cx="2818440" cy="6856920"/>
           </a:xfrm>
           <a:prstGeom prst="rect">
             <a:avLst/>
@@ -3823,7 +3823,7 @@
         <p:spPr>
           <a:xfrm>
             <a:off x="2973240" y="0"/>
-            <a:ext cx="456480" cy="6857280"/>
+            <a:ext cx="456120" cy="6856920"/>
           </a:xfrm>
           <a:prstGeom prst="rect">
             <a:avLst/>
@@ -3842,7 +3842,7 @@
         <p:spPr>
           <a:xfrm>
             <a:off x="3201840" y="0"/>
-            <a:ext cx="761400" cy="6857280"/>
+            <a:ext cx="761040" cy="6856920"/>
           </a:xfrm>
           <a:prstGeom prst="rect">
             <a:avLst/>
@@ -3861,7 +3861,7 @@
         <p:spPr>
           <a:xfrm>
             <a:off x="65880" y="5034960"/>
-            <a:ext cx="9143280" cy="1175040"/>
+            <a:ext cx="9142920" cy="1174680"/>
           </a:xfrm>
           <a:prstGeom prst="rect">
             <a:avLst/>
@@ -3883,7 +3883,7 @@
         <p:spPr>
           <a:xfrm>
             <a:off x="65880" y="3467520"/>
-            <a:ext cx="9143280" cy="889920"/>
+            <a:ext cx="9142920" cy="889560"/>
           </a:xfrm>
           <a:prstGeom prst="rect">
             <a:avLst/>
@@ -3905,7 +3905,7 @@
         <p:spPr>
           <a:xfrm>
             <a:off x="54000" y="5640840"/>
-            <a:ext cx="3003840" cy="1210680"/>
+            <a:ext cx="3003480" cy="1210320"/>
           </a:xfrm>
           <a:prstGeom prst="rect">
             <a:avLst/>
@@ -3927,7 +3927,7 @@
         <p:spPr>
           <a:xfrm>
             <a:off x="65880" y="5284440"/>
-            <a:ext cx="9143280" cy="1477800"/>
+            <a:ext cx="9142920" cy="1477440"/>
           </a:xfrm>
           <a:prstGeom prst="rect">
             <a:avLst/>
@@ -3949,7 +3949,7 @@
         <p:spPr>
           <a:xfrm>
             <a:off x="2215080" y="5132160"/>
-            <a:ext cx="6981840" cy="1719360"/>
+            <a:ext cx="6981480" cy="1719000"/>
           </a:xfrm>
           <a:prstGeom prst="rect">
             <a:avLst/>
@@ -3971,7 +3971,7 @@
         <p:spPr>
           <a:xfrm>
             <a:off x="3528000" y="2552040"/>
-            <a:ext cx="1600560" cy="1387440"/>
+            <a:ext cx="1600200" cy="1387080"/>
           </a:xfrm>
           <a:prstGeom prst="rect">
             <a:avLst/>
@@ -3996,7 +3996,7 @@
         <p:spPr>
           <a:xfrm>
             <a:off x="4251960" y="3818880"/>
-            <a:ext cx="1600560" cy="1387440"/>
+            <a:ext cx="1600200" cy="1387080"/>
           </a:xfrm>
           <a:prstGeom prst="rect">
             <a:avLst/>
@@ -4021,7 +4021,7 @@
         <p:spPr>
           <a:xfrm>
             <a:off x="4261680" y="1285200"/>
-            <a:ext cx="1600560" cy="1387440"/>
+            <a:ext cx="1600200" cy="1387080"/>
           </a:xfrm>
           <a:prstGeom prst="rect">
             <a:avLst/>
@@ -4046,7 +4046,7 @@
         <p:spPr>
           <a:xfrm>
             <a:off x="3508920" y="18360"/>
-            <a:ext cx="1600560" cy="1387440"/>
+            <a:ext cx="1600200" cy="1387080"/>
           </a:xfrm>
           <a:prstGeom prst="rect">
             <a:avLst/>
@@ -4071,7 +4071,7 @@
         <p:spPr>
           <a:xfrm>
             <a:off x="4995000" y="5076000"/>
-            <a:ext cx="1600560" cy="1387440"/>
+            <a:ext cx="1600200" cy="1387080"/>
           </a:xfrm>
           <a:prstGeom prst="rect">
             <a:avLst/>
@@ -4096,7 +4096,7 @@
         <p:spPr>
           <a:xfrm>
             <a:off x="126720" y="3979080"/>
-            <a:ext cx="1260720" cy="1387440"/>
+            <a:ext cx="1260360" cy="1387080"/>
           </a:xfrm>
           <a:prstGeom prst="rect">
             <a:avLst/>
@@ -4121,7 +4121,7 @@
         <p:spPr>
           <a:xfrm>
             <a:off x="556200" y="5095080"/>
-            <a:ext cx="1600560" cy="1387440"/>
+            <a:ext cx="1600200" cy="1387080"/>
           </a:xfrm>
           <a:prstGeom prst="rect">
             <a:avLst/>
@@ -4146,7 +4146,7 @@
         <p:spPr>
           <a:xfrm>
             <a:off x="585000" y="2542320"/>
-            <a:ext cx="1600560" cy="1387440"/>
+            <a:ext cx="1600200" cy="1387080"/>
           </a:xfrm>
           <a:prstGeom prst="rect">
             <a:avLst/>
@@ -4171,7 +4171,7 @@
         <p:spPr>
           <a:xfrm>
             <a:off x="1308600" y="3818880"/>
-            <a:ext cx="1600560" cy="1387440"/>
+            <a:ext cx="1600200" cy="1387080"/>
           </a:xfrm>
           <a:prstGeom prst="rect">
             <a:avLst/>
@@ -4196,7 +4196,7 @@
         <p:spPr>
           <a:xfrm>
             <a:off x="2042280" y="5104440"/>
-            <a:ext cx="1600560" cy="1387440"/>
+            <a:ext cx="1600200" cy="1387080"/>
           </a:xfrm>
           <a:prstGeom prst="rect">
             <a:avLst/>
@@ -4221,7 +4221,7 @@
         <p:spPr>
           <a:xfrm>
             <a:off x="2061360" y="2552040"/>
-            <a:ext cx="1600560" cy="1387440"/>
+            <a:ext cx="1600200" cy="1387080"/>
           </a:xfrm>
           <a:prstGeom prst="rect">
             <a:avLst/>
@@ -4246,7 +4246,7 @@
         <p:spPr>
           <a:xfrm>
             <a:off x="1327680" y="1256400"/>
-            <a:ext cx="1600560" cy="1387440"/>
+            <a:ext cx="1600200" cy="1387080"/>
           </a:xfrm>
           <a:prstGeom prst="rect">
             <a:avLst/>
@@ -4271,7 +4271,7 @@
         <p:spPr>
           <a:xfrm>
             <a:off x="7338240" y="3837600"/>
-            <a:ext cx="1600560" cy="1387440"/>
+            <a:ext cx="1600200" cy="1387080"/>
           </a:xfrm>
           <a:prstGeom prst="rect">
             <a:avLst/>
@@ -4296,7 +4296,7 @@
         <p:spPr>
           <a:xfrm>
             <a:off x="8080920" y="5114160"/>
-            <a:ext cx="1600560" cy="1387440"/>
+            <a:ext cx="1600200" cy="1387080"/>
           </a:xfrm>
           <a:prstGeom prst="rect">
             <a:avLst/>
@@ -4321,7 +4321,7 @@
         <p:spPr>
           <a:xfrm>
             <a:off x="8080920" y="2561400"/>
-            <a:ext cx="1600560" cy="1387440"/>
+            <a:ext cx="1600200" cy="1387080"/>
           </a:xfrm>
           <a:prstGeom prst="rect">
             <a:avLst/>
@@ -4346,7 +4346,7 @@
         <p:spPr>
           <a:xfrm>
             <a:off x="8814600" y="3837600"/>
-            <a:ext cx="1242720" cy="1387440"/>
+            <a:ext cx="1242360" cy="1387080"/>
           </a:xfrm>
           <a:prstGeom prst="rect">
             <a:avLst/>
@@ -4371,7 +4371,7 @@
         <p:spPr>
           <a:xfrm>
             <a:off x="8814600" y="1294200"/>
-            <a:ext cx="1241280" cy="1388160"/>
+            <a:ext cx="1240920" cy="1387800"/>
           </a:xfrm>
           <a:prstGeom prst="rect">
             <a:avLst/>
@@ -4396,7 +4396,7 @@
         <p:spPr>
           <a:xfrm>
             <a:off x="457200" y="333360"/>
-            <a:ext cx="8228880" cy="6184800"/>
+            <a:ext cx="8228520" cy="6184440"/>
           </a:xfrm>
           <a:prstGeom prst="rect">
             <a:avLst/>
@@ -4421,7 +4421,7 @@
         <p:spPr>
           <a:xfrm>
             <a:off x="4561200" y="-21600"/>
-            <a:ext cx="3678480" cy="698400"/>
+            <a:ext cx="3678120" cy="698040"/>
           </a:xfrm>
           <a:prstGeom prst="rect">
             <a:avLst/>
@@ -4446,7 +4446,7 @@
         <p:spPr>
           <a:xfrm>
             <a:off x="4649040" y="-21600"/>
-            <a:ext cx="3504600" cy="623160"/>
+            <a:ext cx="3504240" cy="622800"/>
           </a:xfrm>
           <a:prstGeom prst="rect">
             <a:avLst/>
@@ -4465,7 +4465,7 @@
         <p:spPr>
           <a:xfrm>
             <a:off x="914400" y="0"/>
-            <a:ext cx="1599480" cy="6857280"/>
+            <a:ext cx="1599120" cy="6856920"/>
           </a:xfrm>
           <a:prstGeom prst="rect">
             <a:avLst/>
@@ -4484,7 +4484,7 @@
         <p:spPr>
           <a:xfrm>
             <a:off x="0" y="0"/>
-            <a:ext cx="456480" cy="6857280"/>
+            <a:ext cx="456120" cy="6856920"/>
           </a:xfrm>
           <a:prstGeom prst="rect">
             <a:avLst/>
@@ -4503,7 +4503,7 @@
         <p:spPr>
           <a:xfrm>
             <a:off x="228600" y="0"/>
-            <a:ext cx="761400" cy="6857280"/>
+            <a:ext cx="761040" cy="6856920"/>
           </a:xfrm>
           <a:prstGeom prst="rect">
             <a:avLst/>
@@ -4522,7 +4522,7 @@
         <p:spPr>
           <a:xfrm>
             <a:off x="1337400" y="0"/>
-            <a:ext cx="1599480" cy="6857280"/>
+            <a:ext cx="1599120" cy="6856920"/>
           </a:xfrm>
           <a:prstGeom prst="rect">
             <a:avLst/>
@@ -4541,7 +4541,7 @@
         <p:spPr>
           <a:xfrm>
             <a:off x="423000" y="0"/>
-            <a:ext cx="456480" cy="6857280"/>
+            <a:ext cx="456120" cy="6856920"/>
           </a:xfrm>
           <a:prstGeom prst="rect">
             <a:avLst/>
@@ -4560,7 +4560,7 @@
         <p:spPr>
           <a:xfrm>
             <a:off x="651600" y="0"/>
-            <a:ext cx="761400" cy="6857280"/>
+            <a:ext cx="761040" cy="6856920"/>
           </a:xfrm>
           <a:prstGeom prst="rect">
             <a:avLst/>
@@ -4579,7 +4579,7 @@
         <p:spPr>
           <a:xfrm>
             <a:off x="8229600" y="6858000"/>
-            <a:ext cx="1599480" cy="6857280"/>
+            <a:ext cx="1599120" cy="6856920"/>
           </a:xfrm>
           <a:prstGeom prst="rect">
             <a:avLst/>
@@ -4598,7 +4598,7 @@
         <p:spPr>
           <a:xfrm>
             <a:off x="9144000" y="6858000"/>
-            <a:ext cx="456480" cy="6857280"/>
+            <a:ext cx="456120" cy="6856920"/>
           </a:xfrm>
           <a:prstGeom prst="rect">
             <a:avLst/>
@@ -4617,7 +4617,7 @@
         <p:spPr>
           <a:xfrm>
             <a:off x="8915400" y="6858000"/>
-            <a:ext cx="761400" cy="6857280"/>
+            <a:ext cx="761040" cy="6856920"/>
           </a:xfrm>
           <a:prstGeom prst="rect">
             <a:avLst/>
@@ -4636,7 +4636,7 @@
         <p:spPr>
           <a:xfrm>
             <a:off x="3809880" y="0"/>
-            <a:ext cx="2818800" cy="6857280"/>
+            <a:ext cx="2818440" cy="6856920"/>
           </a:xfrm>
           <a:prstGeom prst="rect">
             <a:avLst/>
@@ -4655,7 +4655,7 @@
         <p:spPr>
           <a:xfrm>
             <a:off x="2895480" y="0"/>
-            <a:ext cx="456480" cy="6857280"/>
+            <a:ext cx="456120" cy="6856920"/>
           </a:xfrm>
           <a:prstGeom prst="rect">
             <a:avLst/>
@@ -4674,7 +4674,7 @@
         <p:spPr>
           <a:xfrm>
             <a:off x="3124080" y="0"/>
-            <a:ext cx="761400" cy="6857280"/>
+            <a:ext cx="761040" cy="6856920"/>
           </a:xfrm>
           <a:prstGeom prst="rect">
             <a:avLst/>
@@ -4693,7 +4693,7 @@
         <p:spPr>
           <a:xfrm>
             <a:off x="-11880" y="5034960"/>
-            <a:ext cx="9143280" cy="1175040"/>
+            <a:ext cx="9142920" cy="1174680"/>
           </a:xfrm>
           <a:prstGeom prst="rect">
             <a:avLst/>
@@ -4715,7 +4715,7 @@
         <p:spPr>
           <a:xfrm>
             <a:off x="-11880" y="3467520"/>
-            <a:ext cx="9143280" cy="889920"/>
+            <a:ext cx="9142920" cy="889560"/>
           </a:xfrm>
           <a:prstGeom prst="rect">
             <a:avLst/>
@@ -4737,7 +4737,7 @@
         <p:spPr>
           <a:xfrm>
             <a:off x="-23760" y="5640840"/>
-            <a:ext cx="3003840" cy="1210680"/>
+            <a:ext cx="3003480" cy="1210320"/>
           </a:xfrm>
           <a:prstGeom prst="rect">
             <a:avLst/>
@@ -4759,7 +4759,7 @@
         <p:spPr>
           <a:xfrm>
             <a:off x="-11880" y="5284440"/>
-            <a:ext cx="9143280" cy="1477800"/>
+            <a:ext cx="9142920" cy="1477440"/>
           </a:xfrm>
           <a:prstGeom prst="rect">
             <a:avLst/>
@@ -4781,7 +4781,7 @@
         <p:spPr>
           <a:xfrm>
             <a:off x="2137680" y="5132160"/>
-            <a:ext cx="6981840" cy="1719360"/>
+            <a:ext cx="6981480" cy="1719000"/>
           </a:xfrm>
           <a:prstGeom prst="rect">
             <a:avLst/>
@@ -4803,7 +4803,7 @@
         <p:spPr>
           <a:xfrm>
             <a:off x="3450600" y="2552040"/>
-            <a:ext cx="1600560" cy="1387440"/>
+            <a:ext cx="1600200" cy="1387080"/>
           </a:xfrm>
           <a:prstGeom prst="rect">
             <a:avLst/>
@@ -4828,7 +4828,7 @@
         <p:spPr>
           <a:xfrm>
             <a:off x="4174560" y="3818880"/>
-            <a:ext cx="1600560" cy="1387440"/>
+            <a:ext cx="1600200" cy="1387080"/>
           </a:xfrm>
           <a:prstGeom prst="rect">
             <a:avLst/>
@@ -4853,7 +4853,7 @@
         <p:spPr>
           <a:xfrm>
             <a:off x="4183920" y="1285200"/>
-            <a:ext cx="1600560" cy="1387440"/>
+            <a:ext cx="1600200" cy="1387080"/>
           </a:xfrm>
           <a:prstGeom prst="rect">
             <a:avLst/>
@@ -4878,7 +4878,7 @@
         <p:spPr>
           <a:xfrm>
             <a:off x="3431520" y="18360"/>
-            <a:ext cx="1600560" cy="1387440"/>
+            <a:ext cx="1600200" cy="1387080"/>
           </a:xfrm>
           <a:prstGeom prst="rect">
             <a:avLst/>
@@ -4903,7 +4903,7 @@
         <p:spPr>
           <a:xfrm>
             <a:off x="4917240" y="5076000"/>
-            <a:ext cx="1600560" cy="1387440"/>
+            <a:ext cx="1600200" cy="1387080"/>
           </a:xfrm>
           <a:prstGeom prst="rect">
             <a:avLst/>
@@ -4928,7 +4928,7 @@
         <p:spPr>
           <a:xfrm>
             <a:off x="49320" y="3979080"/>
-            <a:ext cx="1260720" cy="1387440"/>
+            <a:ext cx="1260360" cy="1387080"/>
           </a:xfrm>
           <a:prstGeom prst="rect">
             <a:avLst/>
@@ -4953,7 +4953,7 @@
         <p:spPr>
           <a:xfrm>
             <a:off x="478800" y="5095080"/>
-            <a:ext cx="1600560" cy="1387440"/>
+            <a:ext cx="1600200" cy="1387080"/>
           </a:xfrm>
           <a:prstGeom prst="rect">
             <a:avLst/>
@@ -4978,7 +4978,7 @@
         <p:spPr>
           <a:xfrm>
             <a:off x="507240" y="2542320"/>
-            <a:ext cx="1600560" cy="1387440"/>
+            <a:ext cx="1600200" cy="1387080"/>
           </a:xfrm>
           <a:prstGeom prst="rect">
             <a:avLst/>
@@ -5003,7 +5003,7 @@
         <p:spPr>
           <a:xfrm>
             <a:off x="1231200" y="3818880"/>
-            <a:ext cx="1600560" cy="1387440"/>
+            <a:ext cx="1600200" cy="1387080"/>
           </a:xfrm>
           <a:prstGeom prst="rect">
             <a:avLst/>
@@ -5028,7 +5028,7 @@
         <p:spPr>
           <a:xfrm>
             <a:off x="1964520" y="5104440"/>
-            <a:ext cx="1600560" cy="1387440"/>
+            <a:ext cx="1600200" cy="1387080"/>
           </a:xfrm>
           <a:prstGeom prst="rect">
             <a:avLst/>
@@ -5053,7 +5053,7 @@
         <p:spPr>
           <a:xfrm>
             <a:off x="1983600" y="2552040"/>
-            <a:ext cx="1600560" cy="1387440"/>
+            <a:ext cx="1600200" cy="1387080"/>
           </a:xfrm>
           <a:prstGeom prst="rect">
             <a:avLst/>
@@ -5078,7 +5078,7 @@
         <p:spPr>
           <a:xfrm>
             <a:off x="1250280" y="1256400"/>
-            <a:ext cx="1600560" cy="1387440"/>
+            <a:ext cx="1600200" cy="1387080"/>
           </a:xfrm>
           <a:prstGeom prst="rect">
             <a:avLst/>
@@ -5103,7 +5103,7 @@
         <p:spPr>
           <a:xfrm>
             <a:off x="7260480" y="3837600"/>
-            <a:ext cx="1600560" cy="1387440"/>
+            <a:ext cx="1600200" cy="1387080"/>
           </a:xfrm>
           <a:prstGeom prst="rect">
             <a:avLst/>
@@ -5128,7 +5128,7 @@
         <p:spPr>
           <a:xfrm>
             <a:off x="8003520" y="5114160"/>
-            <a:ext cx="1600560" cy="1387440"/>
+            <a:ext cx="1600200" cy="1387080"/>
           </a:xfrm>
           <a:prstGeom prst="rect">
             <a:avLst/>
@@ -5153,7 +5153,7 @@
         <p:spPr>
           <a:xfrm>
             <a:off x="8003520" y="2561400"/>
-            <a:ext cx="1600560" cy="1387440"/>
+            <a:ext cx="1600200" cy="1387080"/>
           </a:xfrm>
           <a:prstGeom prst="rect">
             <a:avLst/>
@@ -5178,7 +5178,7 @@
         <p:spPr>
           <a:xfrm>
             <a:off x="8736840" y="3837600"/>
-            <a:ext cx="1242720" cy="1387440"/>
+            <a:ext cx="1242360" cy="1387080"/>
           </a:xfrm>
           <a:prstGeom prst="rect">
             <a:avLst/>
@@ -5203,7 +5203,7 @@
         <p:spPr>
           <a:xfrm>
             <a:off x="8737200" y="1294200"/>
-            <a:ext cx="1241280" cy="1388160"/>
+            <a:ext cx="1240920" cy="1387800"/>
           </a:xfrm>
           <a:prstGeom prst="rect">
             <a:avLst/>
@@ -5228,7 +5228,7 @@
         <p:spPr>
           <a:xfrm>
             <a:off x="4561200" y="-21600"/>
-            <a:ext cx="3678480" cy="6271200"/>
+            <a:ext cx="3678120" cy="6270840"/>
           </a:xfrm>
           <a:prstGeom prst="rect">
             <a:avLst/>
@@ -5253,7 +5253,7 @@
         <p:spPr>
           <a:xfrm>
             <a:off x="4649040" y="-21600"/>
-            <a:ext cx="3504600" cy="2312280"/>
+            <a:ext cx="3504240" cy="2311920"/>
           </a:xfrm>
           <a:prstGeom prst="rect">
             <a:avLst/>
@@ -5272,7 +5272,7 @@
         <p:spPr>
           <a:xfrm>
             <a:off x="4650840" y="6088320"/>
-            <a:ext cx="3504600" cy="81000"/>
+            <a:ext cx="3504240" cy="80640"/>
           </a:xfrm>
           <a:prstGeom prst="rect">
             <a:avLst/>
@@ -5291,7 +5291,7 @@
         <p:spPr>
           <a:xfrm>
             <a:off x="4650840" y="6088320"/>
-            <a:ext cx="3504600" cy="81000"/>
+            <a:ext cx="3504240" cy="80640"/>
           </a:xfrm>
           <a:prstGeom prst="rect">
             <a:avLst/>
@@ -5314,7 +5314,7 @@
         <p:spPr>
           <a:xfrm>
             <a:off x="1043640" y="1027800"/>
-            <a:ext cx="7023960" cy="1142640"/>
+            <a:ext cx="7023600" cy="1142640"/>
           </a:xfrm>
           <a:prstGeom prst="rect">
             <a:avLst/>
@@ -5323,6 +5323,7 @@
         <p:txBody>
           <a:bodyPr anchor="ctr" bIns="0" lIns="0" rIns="0" tIns="0" wrap="none"/>
           <a:p>
+            <a:pPr algn="ctr"/>
             <a:r>
               <a:rPr lang="it-IT"/>
               <a:t>Click to edit the title text format</a:t>
@@ -5344,7 +5345,7 @@
         <p:spPr>
           <a:xfrm>
             <a:off x="457200" y="1604520"/>
-            <a:ext cx="8229240" cy="4525920"/>
+            <a:ext cx="8228880" cy="4525560"/>
           </a:xfrm>
           <a:prstGeom prst="rect">
             <a:avLst/>
@@ -5353,11 +5354,6 @@
         <p:txBody>
           <a:bodyPr bIns="0" lIns="0" rIns="0" tIns="0" wrap="none"/>
           <a:p>
-            <a:pPr>
-              <a:buSzPct val="45000"/>
-              <a:buFont typeface="StarSymbol"/>
-              <a:buChar char=""/>
-            </a:pPr>
             <a:r>
               <a:rPr lang="it-IT"/>
               <a:t>Click to edit the outline text format</a:t>
@@ -5508,7 +5504,7 @@
         <p:spPr>
           <a:xfrm>
             <a:off x="992160" y="0"/>
-            <a:ext cx="1599480" cy="6857280"/>
+            <a:ext cx="1599120" cy="6856920"/>
           </a:xfrm>
           <a:prstGeom prst="rect">
             <a:avLst/>
@@ -5527,7 +5523,7 @@
         <p:spPr>
           <a:xfrm>
             <a:off x="77760" y="0"/>
-            <a:ext cx="456480" cy="6857280"/>
+            <a:ext cx="456120" cy="6856920"/>
           </a:xfrm>
           <a:prstGeom prst="rect">
             <a:avLst/>
@@ -5546,7 +5542,7 @@
         <p:spPr>
           <a:xfrm>
             <a:off x="306360" y="0"/>
-            <a:ext cx="761400" cy="6857280"/>
+            <a:ext cx="761040" cy="6856920"/>
           </a:xfrm>
           <a:prstGeom prst="rect">
             <a:avLst/>
@@ -5565,7 +5561,7 @@
         <p:spPr>
           <a:xfrm>
             <a:off x="1414800" y="0"/>
-            <a:ext cx="1599480" cy="6857280"/>
+            <a:ext cx="1599120" cy="6856920"/>
           </a:xfrm>
           <a:prstGeom prst="rect">
             <a:avLst/>
@@ -5584,7 +5580,7 @@
         <p:spPr>
           <a:xfrm>
             <a:off x="500400" y="0"/>
-            <a:ext cx="456480" cy="6857280"/>
+            <a:ext cx="456120" cy="6856920"/>
           </a:xfrm>
           <a:prstGeom prst="rect">
             <a:avLst/>
@@ -5603,7 +5599,7 @@
         <p:spPr>
           <a:xfrm>
             <a:off x="729000" y="0"/>
-            <a:ext cx="761400" cy="6857280"/>
+            <a:ext cx="761040" cy="6856920"/>
           </a:xfrm>
           <a:prstGeom prst="rect">
             <a:avLst/>
@@ -5622,7 +5618,7 @@
         <p:spPr>
           <a:xfrm>
             <a:off x="8307360" y="6858000"/>
-            <a:ext cx="1599480" cy="6857280"/>
+            <a:ext cx="1599120" cy="6856920"/>
           </a:xfrm>
           <a:prstGeom prst="rect">
             <a:avLst/>
@@ -5641,7 +5637,7 @@
         <p:spPr>
           <a:xfrm>
             <a:off x="9221760" y="6858000"/>
-            <a:ext cx="456480" cy="6857280"/>
+            <a:ext cx="456120" cy="6856920"/>
           </a:xfrm>
           <a:prstGeom prst="rect">
             <a:avLst/>
@@ -5660,7 +5656,7 @@
         <p:spPr>
           <a:xfrm>
             <a:off x="8993160" y="6858000"/>
-            <a:ext cx="761400" cy="6857280"/>
+            <a:ext cx="761040" cy="6856920"/>
           </a:xfrm>
           <a:prstGeom prst="rect">
             <a:avLst/>
@@ -5679,7 +5675,7 @@
         <p:spPr>
           <a:xfrm>
             <a:off x="3887640" y="0"/>
-            <a:ext cx="2818800" cy="6857280"/>
+            <a:ext cx="2818440" cy="6856920"/>
           </a:xfrm>
           <a:prstGeom prst="rect">
             <a:avLst/>
@@ -5698,7 +5694,7 @@
         <p:spPr>
           <a:xfrm>
             <a:off x="2973240" y="0"/>
-            <a:ext cx="456480" cy="6857280"/>
+            <a:ext cx="456120" cy="6856920"/>
           </a:xfrm>
           <a:prstGeom prst="rect">
             <a:avLst/>
@@ -5717,7 +5713,7 @@
         <p:spPr>
           <a:xfrm>
             <a:off x="3201840" y="0"/>
-            <a:ext cx="761400" cy="6857280"/>
+            <a:ext cx="761040" cy="6856920"/>
           </a:xfrm>
           <a:prstGeom prst="rect">
             <a:avLst/>
@@ -5736,7 +5732,7 @@
         <p:spPr>
           <a:xfrm>
             <a:off x="65880" y="5034960"/>
-            <a:ext cx="9143280" cy="1175040"/>
+            <a:ext cx="9142920" cy="1174680"/>
           </a:xfrm>
           <a:prstGeom prst="rect">
             <a:avLst/>
@@ -5758,7 +5754,7 @@
         <p:spPr>
           <a:xfrm>
             <a:off x="65880" y="3467520"/>
-            <a:ext cx="9143280" cy="889920"/>
+            <a:ext cx="9142920" cy="889560"/>
           </a:xfrm>
           <a:prstGeom prst="rect">
             <a:avLst/>
@@ -5780,7 +5776,7 @@
         <p:spPr>
           <a:xfrm>
             <a:off x="54000" y="5640840"/>
-            <a:ext cx="3003840" cy="1210680"/>
+            <a:ext cx="3003480" cy="1210320"/>
           </a:xfrm>
           <a:prstGeom prst="rect">
             <a:avLst/>
@@ -5802,7 +5798,7 @@
         <p:spPr>
           <a:xfrm>
             <a:off x="65880" y="5284440"/>
-            <a:ext cx="9143280" cy="1477800"/>
+            <a:ext cx="9142920" cy="1477440"/>
           </a:xfrm>
           <a:prstGeom prst="rect">
             <a:avLst/>
@@ -5824,7 +5820,7 @@
         <p:spPr>
           <a:xfrm>
             <a:off x="2215080" y="5132160"/>
-            <a:ext cx="6981840" cy="1719360"/>
+            <a:ext cx="6981480" cy="1719000"/>
           </a:xfrm>
           <a:prstGeom prst="rect">
             <a:avLst/>
@@ -5846,7 +5842,7 @@
         <p:spPr>
           <a:xfrm>
             <a:off x="3528000" y="2552040"/>
-            <a:ext cx="1600560" cy="1387440"/>
+            <a:ext cx="1600200" cy="1387080"/>
           </a:xfrm>
           <a:prstGeom prst="rect">
             <a:avLst/>
@@ -5871,7 +5867,7 @@
         <p:spPr>
           <a:xfrm>
             <a:off x="4251960" y="3818880"/>
-            <a:ext cx="1600560" cy="1387440"/>
+            <a:ext cx="1600200" cy="1387080"/>
           </a:xfrm>
           <a:prstGeom prst="rect">
             <a:avLst/>
@@ -5896,7 +5892,7 @@
         <p:spPr>
           <a:xfrm>
             <a:off x="4261680" y="1285200"/>
-            <a:ext cx="1600560" cy="1387440"/>
+            <a:ext cx="1600200" cy="1387080"/>
           </a:xfrm>
           <a:prstGeom prst="rect">
             <a:avLst/>
@@ -5921,7 +5917,7 @@
         <p:spPr>
           <a:xfrm>
             <a:off x="3508920" y="18360"/>
-            <a:ext cx="1600560" cy="1387440"/>
+            <a:ext cx="1600200" cy="1387080"/>
           </a:xfrm>
           <a:prstGeom prst="rect">
             <a:avLst/>
@@ -5946,7 +5942,7 @@
         <p:spPr>
           <a:xfrm>
             <a:off x="4995000" y="5076000"/>
-            <a:ext cx="1600560" cy="1387440"/>
+            <a:ext cx="1600200" cy="1387080"/>
           </a:xfrm>
           <a:prstGeom prst="rect">
             <a:avLst/>
@@ -5971,7 +5967,7 @@
         <p:spPr>
           <a:xfrm>
             <a:off x="126720" y="3979080"/>
-            <a:ext cx="1260720" cy="1387440"/>
+            <a:ext cx="1260360" cy="1387080"/>
           </a:xfrm>
           <a:prstGeom prst="rect">
             <a:avLst/>
@@ -5996,7 +5992,7 @@
         <p:spPr>
           <a:xfrm>
             <a:off x="556200" y="5095080"/>
-            <a:ext cx="1600560" cy="1387440"/>
+            <a:ext cx="1600200" cy="1387080"/>
           </a:xfrm>
           <a:prstGeom prst="rect">
             <a:avLst/>
@@ -6021,7 +6017,7 @@
         <p:spPr>
           <a:xfrm>
             <a:off x="585000" y="2542320"/>
-            <a:ext cx="1600560" cy="1387440"/>
+            <a:ext cx="1600200" cy="1387080"/>
           </a:xfrm>
           <a:prstGeom prst="rect">
             <a:avLst/>
@@ -6046,7 +6042,7 @@
         <p:spPr>
           <a:xfrm>
             <a:off x="1308600" y="3818880"/>
-            <a:ext cx="1600560" cy="1387440"/>
+            <a:ext cx="1600200" cy="1387080"/>
           </a:xfrm>
           <a:prstGeom prst="rect">
             <a:avLst/>
@@ -6071,7 +6067,7 @@
         <p:spPr>
           <a:xfrm>
             <a:off x="2042280" y="5104440"/>
-            <a:ext cx="1600560" cy="1387440"/>
+            <a:ext cx="1600200" cy="1387080"/>
           </a:xfrm>
           <a:prstGeom prst="rect">
             <a:avLst/>
@@ -6096,7 +6092,7 @@
         <p:spPr>
           <a:xfrm>
             <a:off x="2061360" y="2552040"/>
-            <a:ext cx="1600560" cy="1387440"/>
+            <a:ext cx="1600200" cy="1387080"/>
           </a:xfrm>
           <a:prstGeom prst="rect">
             <a:avLst/>
@@ -6121,7 +6117,7 @@
         <p:spPr>
           <a:xfrm>
             <a:off x="1327680" y="1256400"/>
-            <a:ext cx="1600560" cy="1387440"/>
+            <a:ext cx="1600200" cy="1387080"/>
           </a:xfrm>
           <a:prstGeom prst="rect">
             <a:avLst/>
@@ -6146,7 +6142,7 @@
         <p:spPr>
           <a:xfrm>
             <a:off x="7338240" y="3837600"/>
-            <a:ext cx="1600560" cy="1387440"/>
+            <a:ext cx="1600200" cy="1387080"/>
           </a:xfrm>
           <a:prstGeom prst="rect">
             <a:avLst/>
@@ -6171,7 +6167,7 @@
         <p:spPr>
           <a:xfrm>
             <a:off x="8080920" y="5114160"/>
-            <a:ext cx="1600560" cy="1387440"/>
+            <a:ext cx="1600200" cy="1387080"/>
           </a:xfrm>
           <a:prstGeom prst="rect">
             <a:avLst/>
@@ -6196,7 +6192,7 @@
         <p:spPr>
           <a:xfrm>
             <a:off x="8080920" y="2561400"/>
-            <a:ext cx="1600560" cy="1387440"/>
+            <a:ext cx="1600200" cy="1387080"/>
           </a:xfrm>
           <a:prstGeom prst="rect">
             <a:avLst/>
@@ -6221,7 +6217,7 @@
         <p:spPr>
           <a:xfrm>
             <a:off x="8814600" y="3837600"/>
-            <a:ext cx="1242720" cy="1387440"/>
+            <a:ext cx="1242360" cy="1387080"/>
           </a:xfrm>
           <a:prstGeom prst="rect">
             <a:avLst/>
@@ -6246,7 +6242,7 @@
         <p:spPr>
           <a:xfrm>
             <a:off x="8814600" y="1294200"/>
-            <a:ext cx="1241280" cy="1388160"/>
+            <a:ext cx="1240920" cy="1387800"/>
           </a:xfrm>
           <a:prstGeom prst="rect">
             <a:avLst/>
@@ -6271,7 +6267,7 @@
         <p:spPr>
           <a:xfrm>
             <a:off x="457200" y="333360"/>
-            <a:ext cx="8228880" cy="6184800"/>
+            <a:ext cx="8228520" cy="6184440"/>
           </a:xfrm>
           <a:prstGeom prst="rect">
             <a:avLst/>
@@ -6296,7 +6292,7 @@
         <p:spPr>
           <a:xfrm>
             <a:off x="4561200" y="-21600"/>
-            <a:ext cx="3678480" cy="698400"/>
+            <a:ext cx="3678120" cy="698040"/>
           </a:xfrm>
           <a:prstGeom prst="rect">
             <a:avLst/>
@@ -6321,7 +6317,7 @@
         <p:spPr>
           <a:xfrm>
             <a:off x="4649040" y="-21600"/>
-            <a:ext cx="3504600" cy="623160"/>
+            <a:ext cx="3504240" cy="622800"/>
           </a:xfrm>
           <a:prstGeom prst="rect">
             <a:avLst/>
@@ -6539,7 +6535,7 @@
         <p:spPr>
           <a:xfrm>
             <a:off x="992160" y="0"/>
-            <a:ext cx="1599480" cy="6857280"/>
+            <a:ext cx="1599120" cy="6856920"/>
           </a:xfrm>
           <a:prstGeom prst="rect">
             <a:avLst/>
@@ -6558,7 +6554,7 @@
         <p:spPr>
           <a:xfrm>
             <a:off x="77760" y="0"/>
-            <a:ext cx="456480" cy="6857280"/>
+            <a:ext cx="456120" cy="6856920"/>
           </a:xfrm>
           <a:prstGeom prst="rect">
             <a:avLst/>
@@ -6577,7 +6573,7 @@
         <p:spPr>
           <a:xfrm>
             <a:off x="306360" y="0"/>
-            <a:ext cx="761400" cy="6857280"/>
+            <a:ext cx="761040" cy="6856920"/>
           </a:xfrm>
           <a:prstGeom prst="rect">
             <a:avLst/>
@@ -6596,7 +6592,7 @@
         <p:spPr>
           <a:xfrm>
             <a:off x="1414800" y="0"/>
-            <a:ext cx="1599480" cy="6857280"/>
+            <a:ext cx="1599120" cy="6856920"/>
           </a:xfrm>
           <a:prstGeom prst="rect">
             <a:avLst/>
@@ -6615,7 +6611,7 @@
         <p:spPr>
           <a:xfrm>
             <a:off x="500400" y="0"/>
-            <a:ext cx="456480" cy="6857280"/>
+            <a:ext cx="456120" cy="6856920"/>
           </a:xfrm>
           <a:prstGeom prst="rect">
             <a:avLst/>
@@ -6634,7 +6630,7 @@
         <p:spPr>
           <a:xfrm>
             <a:off x="729000" y="0"/>
-            <a:ext cx="761400" cy="6857280"/>
+            <a:ext cx="761040" cy="6856920"/>
           </a:xfrm>
           <a:prstGeom prst="rect">
             <a:avLst/>
@@ -6653,7 +6649,7 @@
         <p:spPr>
           <a:xfrm>
             <a:off x="8307360" y="6858000"/>
-            <a:ext cx="1599480" cy="6857280"/>
+            <a:ext cx="1599120" cy="6856920"/>
           </a:xfrm>
           <a:prstGeom prst="rect">
             <a:avLst/>
@@ -6672,7 +6668,7 @@
         <p:spPr>
           <a:xfrm>
             <a:off x="9221760" y="6858000"/>
-            <a:ext cx="456480" cy="6857280"/>
+            <a:ext cx="456120" cy="6856920"/>
           </a:xfrm>
           <a:prstGeom prst="rect">
             <a:avLst/>
@@ -6691,7 +6687,7 @@
         <p:spPr>
           <a:xfrm>
             <a:off x="8993160" y="6858000"/>
-            <a:ext cx="761400" cy="6857280"/>
+            <a:ext cx="761040" cy="6856920"/>
           </a:xfrm>
           <a:prstGeom prst="rect">
             <a:avLst/>
@@ -6710,7 +6706,7 @@
         <p:spPr>
           <a:xfrm>
             <a:off x="3887640" y="0"/>
-            <a:ext cx="2818800" cy="6857280"/>
+            <a:ext cx="2818440" cy="6856920"/>
           </a:xfrm>
           <a:prstGeom prst="rect">
             <a:avLst/>
@@ -6729,7 +6725,7 @@
         <p:spPr>
           <a:xfrm>
             <a:off x="2973240" y="0"/>
-            <a:ext cx="456480" cy="6857280"/>
+            <a:ext cx="456120" cy="6856920"/>
           </a:xfrm>
           <a:prstGeom prst="rect">
             <a:avLst/>
@@ -6748,7 +6744,7 @@
         <p:spPr>
           <a:xfrm>
             <a:off x="3201840" y="0"/>
-            <a:ext cx="761400" cy="6857280"/>
+            <a:ext cx="761040" cy="6856920"/>
           </a:xfrm>
           <a:prstGeom prst="rect">
             <a:avLst/>
@@ -6767,7 +6763,7 @@
         <p:spPr>
           <a:xfrm>
             <a:off x="65880" y="5034960"/>
-            <a:ext cx="9143280" cy="1175040"/>
+            <a:ext cx="9142920" cy="1174680"/>
           </a:xfrm>
           <a:prstGeom prst="rect">
             <a:avLst/>
@@ -6789,7 +6785,7 @@
         <p:spPr>
           <a:xfrm>
             <a:off x="65880" y="3467520"/>
-            <a:ext cx="9143280" cy="889920"/>
+            <a:ext cx="9142920" cy="889560"/>
           </a:xfrm>
           <a:prstGeom prst="rect">
             <a:avLst/>
@@ -6811,7 +6807,7 @@
         <p:spPr>
           <a:xfrm>
             <a:off x="54000" y="5640840"/>
-            <a:ext cx="3003840" cy="1210680"/>
+            <a:ext cx="3003480" cy="1210320"/>
           </a:xfrm>
           <a:prstGeom prst="rect">
             <a:avLst/>
@@ -6833,7 +6829,7 @@
         <p:spPr>
           <a:xfrm>
             <a:off x="65880" y="5284440"/>
-            <a:ext cx="9143280" cy="1477800"/>
+            <a:ext cx="9142920" cy="1477440"/>
           </a:xfrm>
           <a:prstGeom prst="rect">
             <a:avLst/>
@@ -6855,7 +6851,7 @@
         <p:spPr>
           <a:xfrm>
             <a:off x="2215080" y="5132160"/>
-            <a:ext cx="6981840" cy="1719360"/>
+            <a:ext cx="6981480" cy="1719000"/>
           </a:xfrm>
           <a:prstGeom prst="rect">
             <a:avLst/>
@@ -6877,7 +6873,7 @@
         <p:spPr>
           <a:xfrm>
             <a:off x="3528000" y="2552040"/>
-            <a:ext cx="1600560" cy="1387440"/>
+            <a:ext cx="1600200" cy="1387080"/>
           </a:xfrm>
           <a:prstGeom prst="rect">
             <a:avLst/>
@@ -6902,7 +6898,7 @@
         <p:spPr>
           <a:xfrm>
             <a:off x="4251960" y="3818880"/>
-            <a:ext cx="1600560" cy="1387440"/>
+            <a:ext cx="1600200" cy="1387080"/>
           </a:xfrm>
           <a:prstGeom prst="rect">
             <a:avLst/>
@@ -6927,7 +6923,7 @@
         <p:spPr>
           <a:xfrm>
             <a:off x="4261680" y="1285200"/>
-            <a:ext cx="1600560" cy="1387440"/>
+            <a:ext cx="1600200" cy="1387080"/>
           </a:xfrm>
           <a:prstGeom prst="rect">
             <a:avLst/>
@@ -6952,7 +6948,7 @@
         <p:spPr>
           <a:xfrm>
             <a:off x="3508920" y="18360"/>
-            <a:ext cx="1600560" cy="1387440"/>
+            <a:ext cx="1600200" cy="1387080"/>
           </a:xfrm>
           <a:prstGeom prst="rect">
             <a:avLst/>
@@ -6977,7 +6973,7 @@
         <p:spPr>
           <a:xfrm>
             <a:off x="4995000" y="5076000"/>
-            <a:ext cx="1600560" cy="1387440"/>
+            <a:ext cx="1600200" cy="1387080"/>
           </a:xfrm>
           <a:prstGeom prst="rect">
             <a:avLst/>
@@ -7002,7 +6998,7 @@
         <p:spPr>
           <a:xfrm>
             <a:off x="126720" y="3979080"/>
-            <a:ext cx="1260720" cy="1387440"/>
+            <a:ext cx="1260360" cy="1387080"/>
           </a:xfrm>
           <a:prstGeom prst="rect">
             <a:avLst/>
@@ -7027,7 +7023,7 @@
         <p:spPr>
           <a:xfrm>
             <a:off x="556200" y="5095080"/>
-            <a:ext cx="1600560" cy="1387440"/>
+            <a:ext cx="1600200" cy="1387080"/>
           </a:xfrm>
           <a:prstGeom prst="rect">
             <a:avLst/>
@@ -7052,7 +7048,7 @@
         <p:spPr>
           <a:xfrm>
             <a:off x="585000" y="2542320"/>
-            <a:ext cx="1600560" cy="1387440"/>
+            <a:ext cx="1600200" cy="1387080"/>
           </a:xfrm>
           <a:prstGeom prst="rect">
             <a:avLst/>
@@ -7077,7 +7073,7 @@
         <p:spPr>
           <a:xfrm>
             <a:off x="1308600" y="3818880"/>
-            <a:ext cx="1600560" cy="1387440"/>
+            <a:ext cx="1600200" cy="1387080"/>
           </a:xfrm>
           <a:prstGeom prst="rect">
             <a:avLst/>
@@ -7102,7 +7098,7 @@
         <p:spPr>
           <a:xfrm>
             <a:off x="2042280" y="5104440"/>
-            <a:ext cx="1600560" cy="1387440"/>
+            <a:ext cx="1600200" cy="1387080"/>
           </a:xfrm>
           <a:prstGeom prst="rect">
             <a:avLst/>
@@ -7127,7 +7123,7 @@
         <p:spPr>
           <a:xfrm>
             <a:off x="2061360" y="2552040"/>
-            <a:ext cx="1600560" cy="1387440"/>
+            <a:ext cx="1600200" cy="1387080"/>
           </a:xfrm>
           <a:prstGeom prst="rect">
             <a:avLst/>
@@ -7152,7 +7148,7 @@
         <p:spPr>
           <a:xfrm>
             <a:off x="1327680" y="1256400"/>
-            <a:ext cx="1600560" cy="1387440"/>
+            <a:ext cx="1600200" cy="1387080"/>
           </a:xfrm>
           <a:prstGeom prst="rect">
             <a:avLst/>
@@ -7177,7 +7173,7 @@
         <p:spPr>
           <a:xfrm>
             <a:off x="7338240" y="3837600"/>
-            <a:ext cx="1600560" cy="1387440"/>
+            <a:ext cx="1600200" cy="1387080"/>
           </a:xfrm>
           <a:prstGeom prst="rect">
             <a:avLst/>
@@ -7202,7 +7198,7 @@
         <p:spPr>
           <a:xfrm>
             <a:off x="8080920" y="5114160"/>
-            <a:ext cx="1600560" cy="1387440"/>
+            <a:ext cx="1600200" cy="1387080"/>
           </a:xfrm>
           <a:prstGeom prst="rect">
             <a:avLst/>
@@ -7227,7 +7223,7 @@
         <p:spPr>
           <a:xfrm>
             <a:off x="8080920" y="2561400"/>
-            <a:ext cx="1600560" cy="1387440"/>
+            <a:ext cx="1600200" cy="1387080"/>
           </a:xfrm>
           <a:prstGeom prst="rect">
             <a:avLst/>
@@ -7252,7 +7248,7 @@
         <p:spPr>
           <a:xfrm>
             <a:off x="8814600" y="3837600"/>
-            <a:ext cx="1242720" cy="1387440"/>
+            <a:ext cx="1242360" cy="1387080"/>
           </a:xfrm>
           <a:prstGeom prst="rect">
             <a:avLst/>
@@ -7277,7 +7273,7 @@
         <p:spPr>
           <a:xfrm>
             <a:off x="8814600" y="1294200"/>
-            <a:ext cx="1241280" cy="1388160"/>
+            <a:ext cx="1240920" cy="1387800"/>
           </a:xfrm>
           <a:prstGeom prst="rect">
             <a:avLst/>
@@ -7302,7 +7298,7 @@
         <p:spPr>
           <a:xfrm>
             <a:off x="457200" y="333360"/>
-            <a:ext cx="8228880" cy="6184800"/>
+            <a:ext cx="8228520" cy="6184440"/>
           </a:xfrm>
           <a:prstGeom prst="rect">
             <a:avLst/>
@@ -7327,7 +7323,7 @@
         <p:spPr>
           <a:xfrm>
             <a:off x="4561200" y="-21600"/>
-            <a:ext cx="3678480" cy="698400"/>
+            <a:ext cx="3678120" cy="698040"/>
           </a:xfrm>
           <a:prstGeom prst="rect">
             <a:avLst/>
@@ -7352,7 +7348,7 @@
         <p:spPr>
           <a:xfrm>
             <a:off x="4649040" y="-21600"/>
-            <a:ext cx="3504600" cy="623160"/>
+            <a:ext cx="3504240" cy="622800"/>
           </a:xfrm>
           <a:prstGeom prst="rect">
             <a:avLst/>
@@ -7375,7 +7371,7 @@
         <p:spPr>
           <a:xfrm>
             <a:off x="1043640" y="1027800"/>
-            <a:ext cx="7023960" cy="1142640"/>
+            <a:ext cx="7023600" cy="1142640"/>
           </a:xfrm>
           <a:prstGeom prst="rect">
             <a:avLst/>
@@ -7384,6 +7380,7 @@
         <p:txBody>
           <a:bodyPr anchor="ctr" bIns="0" lIns="0" rIns="0" tIns="0" wrap="none"/>
           <a:p>
+            <a:pPr algn="ctr"/>
             <a:r>
               <a:rPr lang="it-IT"/>
               <a:t>Click to edit the title text format</a:t>
@@ -7569,7 +7566,7 @@
         <p:spPr>
           <a:xfrm>
             <a:off x="179640" y="2512800"/>
-            <a:ext cx="4463640" cy="1635480"/>
+            <a:ext cx="4463280" cy="1635120"/>
           </a:xfrm>
           <a:prstGeom prst="rect">
             <a:avLst/>
@@ -7617,7 +7614,7 @@
         <p:spPr>
           <a:xfrm>
             <a:off x="251640" y="4268520"/>
-            <a:ext cx="4301640" cy="1751760"/>
+            <a:ext cx="4301280" cy="1751400"/>
           </a:xfrm>
           <a:prstGeom prst="rect">
             <a:avLst/>
@@ -7693,7 +7690,7 @@
         <p:spPr>
           <a:xfrm>
             <a:off x="5292000" y="2565000"/>
-            <a:ext cx="2226240" cy="3284280"/>
+            <a:ext cx="2225880" cy="3283920"/>
           </a:xfrm>
           <a:prstGeom prst="rect">
             <a:avLst/>
@@ -7737,7 +7734,7 @@
         <p:spPr>
           <a:xfrm>
             <a:off x="2750760" y="1268640"/>
-            <a:ext cx="3764880" cy="4580280"/>
+            <a:ext cx="3764520" cy="4579920"/>
           </a:xfrm>
           <a:prstGeom prst="rect">
             <a:avLst/>
@@ -7753,7 +7750,7 @@
         <p:spPr>
           <a:xfrm>
             <a:off x="1043640" y="1027800"/>
-            <a:ext cx="7023960" cy="1142280"/>
+            <a:ext cx="7023600" cy="1141920"/>
           </a:xfrm>
           <a:prstGeom prst="rect">
             <a:avLst/>
@@ -7789,7 +7786,7 @@
         <p:spPr>
           <a:xfrm>
             <a:off x="1043640" y="2323800"/>
-            <a:ext cx="6776640" cy="3508200"/>
+            <a:ext cx="6776280" cy="3507840"/>
           </a:xfrm>
           <a:prstGeom prst="rect">
             <a:avLst/>
@@ -7936,7 +7933,7 @@
         <p:spPr>
           <a:xfrm>
             <a:off x="0" y="0"/>
-            <a:ext cx="11796480" cy="11796480"/>
+            <a:ext cx="11796120" cy="11796120"/>
           </a:xfrm>
           <a:prstGeom prst="rect">
             <a:avLst/>
@@ -7972,7 +7969,7 @@
         <p:spPr>
           <a:xfrm>
             <a:off x="0" y="0"/>
-            <a:ext cx="11796480" cy="11796480"/>
+            <a:ext cx="11796120" cy="11796120"/>
           </a:xfrm>
           <a:prstGeom prst="rect">
             <a:avLst/>
@@ -7986,7 +7983,7 @@
                 <a:spcPct val="100000"/>
               </a:lnSpc>
             </a:pPr>
-            <a:fld id="{917141D1-A111-41D1-A1A1-41F141C111F1}" type="slidenum">
+            <a:fld id="{11E1C101-2121-41D1-8191-3191D1911151}" type="slidenum">
               <a:rPr lang="it-IT">
                 <a:solidFill>
                   <a:srgbClr val="000000"/>
@@ -8074,7 +8071,7 @@
         <p:spPr>
           <a:xfrm>
             <a:off x="2751120" y="1268640"/>
-            <a:ext cx="3764880" cy="4580280"/>
+            <a:ext cx="3764520" cy="4579920"/>
           </a:xfrm>
           <a:prstGeom prst="rect">
             <a:avLst/>
@@ -8090,7 +8087,7 @@
         <p:spPr>
           <a:xfrm>
             <a:off x="2592000" y="504000"/>
-            <a:ext cx="5616000" cy="864000"/>
+            <a:ext cx="5615640" cy="863640"/>
           </a:xfrm>
           <a:prstGeom prst="rect">
             <a:avLst/>
@@ -8126,7 +8123,7 @@
         <p:spPr>
           <a:xfrm>
             <a:off x="1008000" y="1656000"/>
-            <a:ext cx="6812640" cy="4176000"/>
+            <a:ext cx="6812280" cy="4175640"/>
           </a:xfrm>
           <a:prstGeom prst="rect">
             <a:avLst/>
@@ -8147,9 +8144,6 @@
               <a:lnSpc>
                 <a:spcPct val="100000"/>
               </a:lnSpc>
-              <a:buSzPct val="76000"/>
-              <a:buFont typeface="Century Gothic"/>
-              <a:buAutoNum type="arabicPeriod"/>
             </a:pPr>
             <a:r>
               <a:rPr b="1" lang="it-IT" sz="2400">
@@ -8254,9 +8248,6 @@
               <a:lnSpc>
                 <a:spcPct val="100000"/>
               </a:lnSpc>
-              <a:buSzPct val="76000"/>
-              <a:buFont typeface="Century Gothic"/>
-              <a:buAutoNum type="arabicPeriod"/>
             </a:pPr>
             <a:endParaRPr/>
           </a:p>
@@ -8265,9 +8256,6 @@
               <a:lnSpc>
                 <a:spcPct val="100000"/>
               </a:lnSpc>
-              <a:buSzPct val="76000"/>
-              <a:buFont typeface="Century Gothic"/>
-              <a:buAutoNum type="arabicPeriod"/>
             </a:pPr>
             <a:r>
               <a:rPr b="1" lang="it-IT" sz="2400">
@@ -8372,9 +8360,6 @@
               <a:lnSpc>
                 <a:spcPct val="100000"/>
               </a:lnSpc>
-              <a:buSzPct val="76000"/>
-              <a:buFont typeface="Century Gothic"/>
-              <a:buAutoNum type="arabicPeriod"/>
             </a:pPr>
             <a:endParaRPr/>
           </a:p>
@@ -8446,7 +8431,7 @@
         <p:spPr>
           <a:xfrm>
             <a:off x="2750760" y="1268640"/>
-            <a:ext cx="3764880" cy="4580280"/>
+            <a:ext cx="3764520" cy="4579920"/>
           </a:xfrm>
           <a:prstGeom prst="rect">
             <a:avLst/>
@@ -8462,7 +8447,7 @@
         <p:spPr>
           <a:xfrm>
             <a:off x="1043640" y="2997000"/>
-            <a:ext cx="7023960" cy="1142280"/>
+            <a:ext cx="7023600" cy="1141920"/>
           </a:xfrm>
           <a:prstGeom prst="rect">
             <a:avLst/>
@@ -8498,7 +8483,7 @@
         <p:spPr>
           <a:xfrm>
             <a:off x="0" y="0"/>
-            <a:ext cx="11796480" cy="11796480"/>
+            <a:ext cx="11796120" cy="11796120"/>
           </a:xfrm>
           <a:prstGeom prst="rect">
             <a:avLst/>
@@ -8534,7 +8519,7 @@
         <p:spPr>
           <a:xfrm>
             <a:off x="0" y="0"/>
-            <a:ext cx="11796480" cy="11796480"/>
+            <a:ext cx="11796120" cy="11796120"/>
           </a:xfrm>
           <a:prstGeom prst="rect">
             <a:avLst/>
@@ -8548,7 +8533,7 @@
                 <a:spcPct val="100000"/>
               </a:lnSpc>
             </a:pPr>
-            <a:fld id="{91C1D171-8191-41A1-B1A1-816101A1C1B1}" type="slidenum">
+            <a:fld id="{B1312151-B131-4151-B101-71C181E1C131}" type="slidenum">
               <a:rPr lang="it-IT">
                 <a:solidFill>
                   <a:srgbClr val="000000"/>
@@ -8607,7 +8592,7 @@
         <p:spPr>
           <a:xfrm>
             <a:off x="2750760" y="1268640"/>
-            <a:ext cx="3764880" cy="4580280"/>
+            <a:ext cx="3764520" cy="4579920"/>
           </a:xfrm>
           <a:prstGeom prst="rect">
             <a:avLst/>
@@ -8623,7 +8608,7 @@
         <p:spPr>
           <a:xfrm>
             <a:off x="0" y="0"/>
-            <a:ext cx="11796480" cy="11796480"/>
+            <a:ext cx="11796120" cy="11796120"/>
           </a:xfrm>
           <a:prstGeom prst="rect">
             <a:avLst/>
@@ -8659,7 +8644,7 @@
         <p:spPr>
           <a:xfrm>
             <a:off x="0" y="0"/>
-            <a:ext cx="11796480" cy="11796480"/>
+            <a:ext cx="11796120" cy="11796120"/>
           </a:xfrm>
           <a:prstGeom prst="rect">
             <a:avLst/>
@@ -8673,7 +8658,7 @@
                 <a:spcPct val="100000"/>
               </a:lnSpc>
             </a:pPr>
-            <a:fld id="{2121F1E1-A181-41D1-81A1-719131E13141}" type="slidenum">
+            <a:fld id="{91E1B1E1-D181-41D1-8121-31816101F101}" type="slidenum">
               <a:rPr lang="it-IT">
                 <a:solidFill>
                   <a:srgbClr val="000000"/>
@@ -8704,7 +8689,7 @@
         <p:spPr>
           <a:xfrm>
             <a:off x="1187640" y="2421000"/>
-            <a:ext cx="6912000" cy="2010240"/>
+            <a:ext cx="6911640" cy="2009880"/>
           </a:xfrm>
           <a:prstGeom prst="rect">
             <a:avLst/>
@@ -8867,7 +8852,7 @@
         <p:spPr>
           <a:xfrm>
             <a:off x="2750760" y="1268640"/>
-            <a:ext cx="3764880" cy="4580280"/>
+            <a:ext cx="3764520" cy="4579920"/>
           </a:xfrm>
           <a:prstGeom prst="rect">
             <a:avLst/>
@@ -8883,7 +8868,7 @@
         <p:spPr>
           <a:xfrm>
             <a:off x="1152000" y="369360"/>
-            <a:ext cx="7023960" cy="1142280"/>
+            <a:ext cx="7023600" cy="1141920"/>
           </a:xfrm>
           <a:prstGeom prst="rect">
             <a:avLst/>
@@ -8919,7 +8904,7 @@
         <p:spPr>
           <a:xfrm>
             <a:off x="0" y="0"/>
-            <a:ext cx="11796480" cy="11796480"/>
+            <a:ext cx="11796120" cy="11796120"/>
           </a:xfrm>
           <a:prstGeom prst="rect">
             <a:avLst/>
@@ -8955,7 +8940,7 @@
         <p:spPr>
           <a:xfrm>
             <a:off x="0" y="0"/>
-            <a:ext cx="11796480" cy="11796480"/>
+            <a:ext cx="11796120" cy="11796120"/>
           </a:xfrm>
           <a:prstGeom prst="rect">
             <a:avLst/>
@@ -8969,7 +8954,7 @@
                 <a:spcPct val="100000"/>
               </a:lnSpc>
             </a:pPr>
-            <a:fld id="{F1912141-C1A1-41F1-B1C1-B1C151410161}" type="slidenum">
+            <a:fld id="{B181E171-81B1-4151-A191-51F161C1C171}" type="slidenum">
               <a:rPr lang="it-IT">
                 <a:solidFill>
                   <a:srgbClr val="000000"/>
@@ -9006,7 +8991,7 @@
         <p:spPr>
           <a:xfrm>
             <a:off x="648000" y="2016000"/>
-            <a:ext cx="2159640" cy="3599640"/>
+            <a:ext cx="2159280" cy="3599280"/>
           </a:xfrm>
           <a:prstGeom prst="rect">
             <a:avLst/>
@@ -9028,7 +9013,7 @@
         <p:spPr>
           <a:xfrm>
             <a:off x="3240000" y="2016000"/>
-            <a:ext cx="2159640" cy="3599640"/>
+            <a:ext cx="2159280" cy="3599280"/>
           </a:xfrm>
           <a:prstGeom prst="rect">
             <a:avLst/>
@@ -9050,7 +9035,7 @@
         <p:spPr>
           <a:xfrm>
             <a:off x="6048000" y="2016000"/>
-            <a:ext cx="2159640" cy="3599640"/>
+            <a:ext cx="2159280" cy="3599280"/>
           </a:xfrm>
           <a:prstGeom prst="rect">
             <a:avLst/>
@@ -9066,7 +9051,7 @@
         <p:spPr>
           <a:xfrm>
             <a:off x="648000" y="1512000"/>
-            <a:ext cx="7775640" cy="345960"/>
+            <a:ext cx="7775280" cy="345600"/>
           </a:xfrm>
           <a:prstGeom prst="rect">
             <a:avLst/>
@@ -9193,7 +9178,7 @@
         <p:spPr>
           <a:xfrm>
             <a:off x="2750760" y="1268640"/>
-            <a:ext cx="3764880" cy="4580280"/>
+            <a:ext cx="3764520" cy="4579920"/>
           </a:xfrm>
           <a:prstGeom prst="rect">
             <a:avLst/>
@@ -9209,7 +9194,7 @@
         <p:spPr>
           <a:xfrm>
             <a:off x="1152000" y="369360"/>
-            <a:ext cx="7023960" cy="1142280"/>
+            <a:ext cx="7023600" cy="1141920"/>
           </a:xfrm>
           <a:prstGeom prst="rect">
             <a:avLst/>
@@ -9245,7 +9230,7 @@
         <p:spPr>
           <a:xfrm>
             <a:off x="0" y="0"/>
-            <a:ext cx="11796480" cy="11796480"/>
+            <a:ext cx="11796120" cy="11796120"/>
           </a:xfrm>
           <a:prstGeom prst="rect">
             <a:avLst/>
@@ -9281,7 +9266,7 @@
         <p:spPr>
           <a:xfrm>
             <a:off x="0" y="0"/>
-            <a:ext cx="11796480" cy="11796480"/>
+            <a:ext cx="11796120" cy="11796120"/>
           </a:xfrm>
           <a:prstGeom prst="rect">
             <a:avLst/>
@@ -9295,7 +9280,7 @@
                 <a:spcPct val="100000"/>
               </a:lnSpc>
             </a:pPr>
-            <a:fld id="{01417121-C181-41A1-B191-41D191A17141}" type="slidenum">
+            <a:fld id="{F1714111-E1F1-4151-B191-B1C11151E1F1}" type="slidenum">
               <a:rPr lang="it-IT">
                 <a:solidFill>
                   <a:srgbClr val="000000"/>
@@ -9326,7 +9311,7 @@
         <p:spPr>
           <a:xfrm>
             <a:off x="648000" y="1512000"/>
-            <a:ext cx="7775640" cy="345960"/>
+            <a:ext cx="7775280" cy="345600"/>
           </a:xfrm>
           <a:prstGeom prst="rect">
             <a:avLst/>
@@ -9402,7 +9387,7 @@
         <p:spPr>
           <a:xfrm>
             <a:off x="648000" y="2160000"/>
-            <a:ext cx="2159640" cy="3599640"/>
+            <a:ext cx="2159280" cy="3599280"/>
           </a:xfrm>
           <a:prstGeom prst="rect">
             <a:avLst/>
@@ -9424,7 +9409,7 @@
         <p:spPr>
           <a:xfrm>
             <a:off x="288000" y="5328000"/>
-            <a:ext cx="1799640" cy="1079640"/>
+            <a:ext cx="1799280" cy="1079280"/>
           </a:xfrm>
           <a:prstGeom prst="rect">
             <a:avLst/>
@@ -9446,7 +9431,7 @@
         <p:spPr>
           <a:xfrm>
             <a:off x="3384000" y="2160000"/>
-            <a:ext cx="2159640" cy="3599640"/>
+            <a:ext cx="2159280" cy="3599280"/>
           </a:xfrm>
           <a:prstGeom prst="rect">
             <a:avLst/>
@@ -9468,7 +9453,7 @@
         <p:spPr>
           <a:xfrm>
             <a:off x="6048000" y="2160000"/>
-            <a:ext cx="2159640" cy="3599640"/>
+            <a:ext cx="2159280" cy="3599280"/>
           </a:xfrm>
           <a:prstGeom prst="rect">
             <a:avLst/>

</xml_diff>